<commit_message>
Km, kcat --has model-> michaelis_menten_kinetics
</commit_message>
<xml_diff>
--- a/Abbaspour/CodeTodo.pptx
+++ b/Abbaspour/CodeTodo.pptx
@@ -154,10 +154,9 @@
           </a:lstStyle>
           <a:p>
             <a:r>
-              <a:rPr lang="en-US" smtClean="0"/>
+              <a:rPr lang="en-US"/>
               <a:t>Click to edit Master title style</a:t>
             </a:r>
-            <a:endParaRPr lang="en-US"/>
           </a:p>
         </p:txBody>
       </p:sp>
@@ -219,10 +218,9 @@
           </a:lstStyle>
           <a:p>
             <a:r>
-              <a:rPr lang="en-US" smtClean="0"/>
+              <a:rPr lang="en-US"/>
               <a:t>Click to edit Master subtitle style</a:t>
             </a:r>
-            <a:endParaRPr lang="en-US"/>
           </a:p>
         </p:txBody>
       </p:sp>
@@ -243,7 +241,7 @@
           <a:p>
             <a:fld id="{D6E7CE26-7B26-4829-8ED6-15EC512A912A}" type="datetimeFigureOut">
               <a:rPr lang="en-US" smtClean="0"/>
-              <a:t>12/22/2023</a:t>
+              <a:t>1/11/2024</a:t>
             </a:fld>
             <a:endParaRPr lang="en-US"/>
           </a:p>
@@ -285,7 +283,7 @@
           <a:p>
             <a:fld id="{87F34453-351E-48B2-B697-BECC1AAADE2A}" type="slidenum">
               <a:rPr lang="en-US" smtClean="0"/>
-              <a:t>‹#›</a:t>
+              <a:t>‹Nr.›</a:t>
             </a:fld>
             <a:endParaRPr lang="en-US"/>
           </a:p>
@@ -337,10 +335,9 @@
           <a:lstStyle/>
           <a:p>
             <a:r>
-              <a:rPr lang="en-US" smtClean="0"/>
+              <a:rPr lang="en-US"/>
               <a:t>Click to edit Master title style</a:t>
             </a:r>
-            <a:endParaRPr lang="en-US"/>
           </a:p>
         </p:txBody>
       </p:sp>
@@ -361,38 +358,37 @@
           <a:p>
             <a:pPr lvl="0"/>
             <a:r>
-              <a:rPr lang="en-US" smtClean="0"/>
+              <a:rPr lang="en-US"/>
               <a:t>Edit Master text styles</a:t>
             </a:r>
           </a:p>
           <a:p>
             <a:pPr lvl="1"/>
             <a:r>
-              <a:rPr lang="en-US" smtClean="0"/>
+              <a:rPr lang="en-US"/>
               <a:t>Second level</a:t>
             </a:r>
           </a:p>
           <a:p>
             <a:pPr lvl="2"/>
             <a:r>
-              <a:rPr lang="en-US" smtClean="0"/>
+              <a:rPr lang="en-US"/>
               <a:t>Third level</a:t>
             </a:r>
           </a:p>
           <a:p>
             <a:pPr lvl="3"/>
             <a:r>
-              <a:rPr lang="en-US" smtClean="0"/>
+              <a:rPr lang="en-US"/>
               <a:t>Fourth level</a:t>
             </a:r>
           </a:p>
           <a:p>
             <a:pPr lvl="4"/>
             <a:r>
-              <a:rPr lang="en-US" smtClean="0"/>
+              <a:rPr lang="en-US"/>
               <a:t>Fifth level</a:t>
             </a:r>
-            <a:endParaRPr lang="en-US"/>
           </a:p>
         </p:txBody>
       </p:sp>
@@ -413,7 +409,7 @@
           <a:p>
             <a:fld id="{D6E7CE26-7B26-4829-8ED6-15EC512A912A}" type="datetimeFigureOut">
               <a:rPr lang="en-US" smtClean="0"/>
-              <a:t>12/22/2023</a:t>
+              <a:t>1/11/2024</a:t>
             </a:fld>
             <a:endParaRPr lang="en-US"/>
           </a:p>
@@ -455,7 +451,7 @@
           <a:p>
             <a:fld id="{87F34453-351E-48B2-B697-BECC1AAADE2A}" type="slidenum">
               <a:rPr lang="en-US" smtClean="0"/>
-              <a:t>‹#›</a:t>
+              <a:t>‹Nr.›</a:t>
             </a:fld>
             <a:endParaRPr lang="en-US"/>
           </a:p>
@@ -512,10 +508,9 @@
           <a:lstStyle/>
           <a:p>
             <a:r>
-              <a:rPr lang="en-US" smtClean="0"/>
+              <a:rPr lang="en-US"/>
               <a:t>Click to edit Master title style</a:t>
             </a:r>
-            <a:endParaRPr lang="en-US"/>
           </a:p>
         </p:txBody>
       </p:sp>
@@ -541,38 +536,37 @@
           <a:p>
             <a:pPr lvl="0"/>
             <a:r>
-              <a:rPr lang="en-US" smtClean="0"/>
+              <a:rPr lang="en-US"/>
               <a:t>Edit Master text styles</a:t>
             </a:r>
           </a:p>
           <a:p>
             <a:pPr lvl="1"/>
             <a:r>
-              <a:rPr lang="en-US" smtClean="0"/>
+              <a:rPr lang="en-US"/>
               <a:t>Second level</a:t>
             </a:r>
           </a:p>
           <a:p>
             <a:pPr lvl="2"/>
             <a:r>
-              <a:rPr lang="en-US" smtClean="0"/>
+              <a:rPr lang="en-US"/>
               <a:t>Third level</a:t>
             </a:r>
           </a:p>
           <a:p>
             <a:pPr lvl="3"/>
             <a:r>
-              <a:rPr lang="en-US" smtClean="0"/>
+              <a:rPr lang="en-US"/>
               <a:t>Fourth level</a:t>
             </a:r>
           </a:p>
           <a:p>
             <a:pPr lvl="4"/>
             <a:r>
-              <a:rPr lang="en-US" smtClean="0"/>
+              <a:rPr lang="en-US"/>
               <a:t>Fifth level</a:t>
             </a:r>
-            <a:endParaRPr lang="en-US"/>
           </a:p>
         </p:txBody>
       </p:sp>
@@ -593,7 +587,7 @@
           <a:p>
             <a:fld id="{D6E7CE26-7B26-4829-8ED6-15EC512A912A}" type="datetimeFigureOut">
               <a:rPr lang="en-US" smtClean="0"/>
-              <a:t>12/22/2023</a:t>
+              <a:t>1/11/2024</a:t>
             </a:fld>
             <a:endParaRPr lang="en-US"/>
           </a:p>
@@ -635,7 +629,7 @@
           <a:p>
             <a:fld id="{87F34453-351E-48B2-B697-BECC1AAADE2A}" type="slidenum">
               <a:rPr lang="en-US" smtClean="0"/>
-              <a:t>‹#›</a:t>
+              <a:t>‹Nr.›</a:t>
             </a:fld>
             <a:endParaRPr lang="en-US"/>
           </a:p>
@@ -687,10 +681,9 @@
           <a:lstStyle/>
           <a:p>
             <a:r>
-              <a:rPr lang="en-US" smtClean="0"/>
+              <a:rPr lang="en-US"/>
               <a:t>Click to edit Master title style</a:t>
             </a:r>
-            <a:endParaRPr lang="en-US"/>
           </a:p>
         </p:txBody>
       </p:sp>
@@ -711,38 +704,37 @@
           <a:p>
             <a:pPr lvl="0"/>
             <a:r>
-              <a:rPr lang="en-US" smtClean="0"/>
+              <a:rPr lang="en-US"/>
               <a:t>Edit Master text styles</a:t>
             </a:r>
           </a:p>
           <a:p>
             <a:pPr lvl="1"/>
             <a:r>
-              <a:rPr lang="en-US" smtClean="0"/>
+              <a:rPr lang="en-US"/>
               <a:t>Second level</a:t>
             </a:r>
           </a:p>
           <a:p>
             <a:pPr lvl="2"/>
             <a:r>
-              <a:rPr lang="en-US" smtClean="0"/>
+              <a:rPr lang="en-US"/>
               <a:t>Third level</a:t>
             </a:r>
           </a:p>
           <a:p>
             <a:pPr lvl="3"/>
             <a:r>
-              <a:rPr lang="en-US" smtClean="0"/>
+              <a:rPr lang="en-US"/>
               <a:t>Fourth level</a:t>
             </a:r>
           </a:p>
           <a:p>
             <a:pPr lvl="4"/>
             <a:r>
-              <a:rPr lang="en-US" smtClean="0"/>
+              <a:rPr lang="en-US"/>
               <a:t>Fifth level</a:t>
             </a:r>
-            <a:endParaRPr lang="en-US"/>
           </a:p>
         </p:txBody>
       </p:sp>
@@ -763,7 +755,7 @@
           <a:p>
             <a:fld id="{D6E7CE26-7B26-4829-8ED6-15EC512A912A}" type="datetimeFigureOut">
               <a:rPr lang="en-US" smtClean="0"/>
-              <a:t>12/22/2023</a:t>
+              <a:t>1/11/2024</a:t>
             </a:fld>
             <a:endParaRPr lang="en-US"/>
           </a:p>
@@ -805,7 +797,7 @@
           <a:p>
             <a:fld id="{87F34453-351E-48B2-B697-BECC1AAADE2A}" type="slidenum">
               <a:rPr lang="en-US" smtClean="0"/>
-              <a:t>‹#›</a:t>
+              <a:t>‹Nr.›</a:t>
             </a:fld>
             <a:endParaRPr lang="en-US"/>
           </a:p>
@@ -866,10 +858,9 @@
           </a:lstStyle>
           <a:p>
             <a:r>
-              <a:rPr lang="en-US" smtClean="0"/>
+              <a:rPr lang="en-US"/>
               <a:t>Click to edit Master title style</a:t>
             </a:r>
-            <a:endParaRPr lang="en-US"/>
           </a:p>
         </p:txBody>
       </p:sp>
@@ -986,7 +977,7 @@
           <a:p>
             <a:pPr lvl="0"/>
             <a:r>
-              <a:rPr lang="en-US" smtClean="0"/>
+              <a:rPr lang="en-US"/>
               <a:t>Edit Master text styles</a:t>
             </a:r>
           </a:p>
@@ -1009,7 +1000,7 @@
           <a:p>
             <a:fld id="{D6E7CE26-7B26-4829-8ED6-15EC512A912A}" type="datetimeFigureOut">
               <a:rPr lang="en-US" smtClean="0"/>
-              <a:t>12/22/2023</a:t>
+              <a:t>1/11/2024</a:t>
             </a:fld>
             <a:endParaRPr lang="en-US"/>
           </a:p>
@@ -1051,7 +1042,7 @@
           <a:p>
             <a:fld id="{87F34453-351E-48B2-B697-BECC1AAADE2A}" type="slidenum">
               <a:rPr lang="en-US" smtClean="0"/>
-              <a:t>‹#›</a:t>
+              <a:t>‹Nr.›</a:t>
             </a:fld>
             <a:endParaRPr lang="en-US"/>
           </a:p>
@@ -1103,10 +1094,9 @@
           <a:lstStyle/>
           <a:p>
             <a:r>
-              <a:rPr lang="en-US" smtClean="0"/>
+              <a:rPr lang="en-US"/>
               <a:t>Click to edit Master title style</a:t>
             </a:r>
-            <a:endParaRPr lang="en-US"/>
           </a:p>
         </p:txBody>
       </p:sp>
@@ -1132,38 +1122,37 @@
           <a:p>
             <a:pPr lvl="0"/>
             <a:r>
-              <a:rPr lang="en-US" smtClean="0"/>
+              <a:rPr lang="en-US"/>
               <a:t>Edit Master text styles</a:t>
             </a:r>
           </a:p>
           <a:p>
             <a:pPr lvl="1"/>
             <a:r>
-              <a:rPr lang="en-US" smtClean="0"/>
+              <a:rPr lang="en-US"/>
               <a:t>Second level</a:t>
             </a:r>
           </a:p>
           <a:p>
             <a:pPr lvl="2"/>
             <a:r>
-              <a:rPr lang="en-US" smtClean="0"/>
+              <a:rPr lang="en-US"/>
               <a:t>Third level</a:t>
             </a:r>
           </a:p>
           <a:p>
             <a:pPr lvl="3"/>
             <a:r>
-              <a:rPr lang="en-US" smtClean="0"/>
+              <a:rPr lang="en-US"/>
               <a:t>Fourth level</a:t>
             </a:r>
           </a:p>
           <a:p>
             <a:pPr lvl="4"/>
             <a:r>
-              <a:rPr lang="en-US" smtClean="0"/>
+              <a:rPr lang="en-US"/>
               <a:t>Fifth level</a:t>
             </a:r>
-            <a:endParaRPr lang="en-US"/>
           </a:p>
         </p:txBody>
       </p:sp>
@@ -1189,38 +1178,37 @@
           <a:p>
             <a:pPr lvl="0"/>
             <a:r>
-              <a:rPr lang="en-US" smtClean="0"/>
+              <a:rPr lang="en-US"/>
               <a:t>Edit Master text styles</a:t>
             </a:r>
           </a:p>
           <a:p>
             <a:pPr lvl="1"/>
             <a:r>
-              <a:rPr lang="en-US" smtClean="0"/>
+              <a:rPr lang="en-US"/>
               <a:t>Second level</a:t>
             </a:r>
           </a:p>
           <a:p>
             <a:pPr lvl="2"/>
             <a:r>
-              <a:rPr lang="en-US" smtClean="0"/>
+              <a:rPr lang="en-US"/>
               <a:t>Third level</a:t>
             </a:r>
           </a:p>
           <a:p>
             <a:pPr lvl="3"/>
             <a:r>
-              <a:rPr lang="en-US" smtClean="0"/>
+              <a:rPr lang="en-US"/>
               <a:t>Fourth level</a:t>
             </a:r>
           </a:p>
           <a:p>
             <a:pPr lvl="4"/>
             <a:r>
-              <a:rPr lang="en-US" smtClean="0"/>
+              <a:rPr lang="en-US"/>
               <a:t>Fifth level</a:t>
             </a:r>
-            <a:endParaRPr lang="en-US"/>
           </a:p>
         </p:txBody>
       </p:sp>
@@ -1241,7 +1229,7 @@
           <a:p>
             <a:fld id="{D6E7CE26-7B26-4829-8ED6-15EC512A912A}" type="datetimeFigureOut">
               <a:rPr lang="en-US" smtClean="0"/>
-              <a:t>12/22/2023</a:t>
+              <a:t>1/11/2024</a:t>
             </a:fld>
             <a:endParaRPr lang="en-US"/>
           </a:p>
@@ -1283,7 +1271,7 @@
           <a:p>
             <a:fld id="{87F34453-351E-48B2-B697-BECC1AAADE2A}" type="slidenum">
               <a:rPr lang="en-US" smtClean="0"/>
-              <a:t>‹#›</a:t>
+              <a:t>‹Nr.›</a:t>
             </a:fld>
             <a:endParaRPr lang="en-US"/>
           </a:p>
@@ -1340,10 +1328,9 @@
           <a:lstStyle/>
           <a:p>
             <a:r>
-              <a:rPr lang="en-US" smtClean="0"/>
+              <a:rPr lang="en-US"/>
               <a:t>Click to edit Master title style</a:t>
             </a:r>
-            <a:endParaRPr lang="en-US"/>
           </a:p>
         </p:txBody>
       </p:sp>
@@ -1406,7 +1393,7 @@
           <a:p>
             <a:pPr lvl="0"/>
             <a:r>
-              <a:rPr lang="en-US" smtClean="0"/>
+              <a:rPr lang="en-US"/>
               <a:t>Edit Master text styles</a:t>
             </a:r>
           </a:p>
@@ -1434,38 +1421,37 @@
           <a:p>
             <a:pPr lvl="0"/>
             <a:r>
-              <a:rPr lang="en-US" smtClean="0"/>
+              <a:rPr lang="en-US"/>
               <a:t>Edit Master text styles</a:t>
             </a:r>
           </a:p>
           <a:p>
             <a:pPr lvl="1"/>
             <a:r>
-              <a:rPr lang="en-US" smtClean="0"/>
+              <a:rPr lang="en-US"/>
               <a:t>Second level</a:t>
             </a:r>
           </a:p>
           <a:p>
             <a:pPr lvl="2"/>
             <a:r>
-              <a:rPr lang="en-US" smtClean="0"/>
+              <a:rPr lang="en-US"/>
               <a:t>Third level</a:t>
             </a:r>
           </a:p>
           <a:p>
             <a:pPr lvl="3"/>
             <a:r>
-              <a:rPr lang="en-US" smtClean="0"/>
+              <a:rPr lang="en-US"/>
               <a:t>Fourth level</a:t>
             </a:r>
           </a:p>
           <a:p>
             <a:pPr lvl="4"/>
             <a:r>
-              <a:rPr lang="en-US" smtClean="0"/>
+              <a:rPr lang="en-US"/>
               <a:t>Fifth level</a:t>
             </a:r>
-            <a:endParaRPr lang="en-US"/>
           </a:p>
         </p:txBody>
       </p:sp>
@@ -1528,7 +1514,7 @@
           <a:p>
             <a:pPr lvl="0"/>
             <a:r>
-              <a:rPr lang="en-US" smtClean="0"/>
+              <a:rPr lang="en-US"/>
               <a:t>Edit Master text styles</a:t>
             </a:r>
           </a:p>
@@ -1556,38 +1542,37 @@
           <a:p>
             <a:pPr lvl="0"/>
             <a:r>
-              <a:rPr lang="en-US" smtClean="0"/>
+              <a:rPr lang="en-US"/>
               <a:t>Edit Master text styles</a:t>
             </a:r>
           </a:p>
           <a:p>
             <a:pPr lvl="1"/>
             <a:r>
-              <a:rPr lang="en-US" smtClean="0"/>
+              <a:rPr lang="en-US"/>
               <a:t>Second level</a:t>
             </a:r>
           </a:p>
           <a:p>
             <a:pPr lvl="2"/>
             <a:r>
-              <a:rPr lang="en-US" smtClean="0"/>
+              <a:rPr lang="en-US"/>
               <a:t>Third level</a:t>
             </a:r>
           </a:p>
           <a:p>
             <a:pPr lvl="3"/>
             <a:r>
-              <a:rPr lang="en-US" smtClean="0"/>
+              <a:rPr lang="en-US"/>
               <a:t>Fourth level</a:t>
             </a:r>
           </a:p>
           <a:p>
             <a:pPr lvl="4"/>
             <a:r>
-              <a:rPr lang="en-US" smtClean="0"/>
+              <a:rPr lang="en-US"/>
               <a:t>Fifth level</a:t>
             </a:r>
-            <a:endParaRPr lang="en-US"/>
           </a:p>
         </p:txBody>
       </p:sp>
@@ -1608,7 +1593,7 @@
           <a:p>
             <a:fld id="{D6E7CE26-7B26-4829-8ED6-15EC512A912A}" type="datetimeFigureOut">
               <a:rPr lang="en-US" smtClean="0"/>
-              <a:t>12/22/2023</a:t>
+              <a:t>1/11/2024</a:t>
             </a:fld>
             <a:endParaRPr lang="en-US"/>
           </a:p>
@@ -1650,7 +1635,7 @@
           <a:p>
             <a:fld id="{87F34453-351E-48B2-B697-BECC1AAADE2A}" type="slidenum">
               <a:rPr lang="en-US" smtClean="0"/>
-              <a:t>‹#›</a:t>
+              <a:t>‹Nr.›</a:t>
             </a:fld>
             <a:endParaRPr lang="en-US"/>
           </a:p>
@@ -1702,10 +1687,9 @@
           <a:lstStyle/>
           <a:p>
             <a:r>
-              <a:rPr lang="en-US" smtClean="0"/>
+              <a:rPr lang="en-US"/>
               <a:t>Click to edit Master title style</a:t>
             </a:r>
-            <a:endParaRPr lang="en-US"/>
           </a:p>
         </p:txBody>
       </p:sp>
@@ -1726,7 +1710,7 @@
           <a:p>
             <a:fld id="{D6E7CE26-7B26-4829-8ED6-15EC512A912A}" type="datetimeFigureOut">
               <a:rPr lang="en-US" smtClean="0"/>
-              <a:t>12/22/2023</a:t>
+              <a:t>1/11/2024</a:t>
             </a:fld>
             <a:endParaRPr lang="en-US"/>
           </a:p>
@@ -1768,7 +1752,7 @@
           <a:p>
             <a:fld id="{87F34453-351E-48B2-B697-BECC1AAADE2A}" type="slidenum">
               <a:rPr lang="en-US" smtClean="0"/>
-              <a:t>‹#›</a:t>
+              <a:t>‹Nr.›</a:t>
             </a:fld>
             <a:endParaRPr lang="en-US"/>
           </a:p>
@@ -1821,7 +1805,7 @@
           <a:p>
             <a:fld id="{D6E7CE26-7B26-4829-8ED6-15EC512A912A}" type="datetimeFigureOut">
               <a:rPr lang="en-US" smtClean="0"/>
-              <a:t>12/22/2023</a:t>
+              <a:t>1/11/2024</a:t>
             </a:fld>
             <a:endParaRPr lang="en-US"/>
           </a:p>
@@ -1863,7 +1847,7 @@
           <a:p>
             <a:fld id="{87F34453-351E-48B2-B697-BECC1AAADE2A}" type="slidenum">
               <a:rPr lang="en-US" smtClean="0"/>
-              <a:t>‹#›</a:t>
+              <a:t>‹Nr.›</a:t>
             </a:fld>
             <a:endParaRPr lang="en-US"/>
           </a:p>
@@ -1924,10 +1908,9 @@
           </a:lstStyle>
           <a:p>
             <a:r>
-              <a:rPr lang="en-US" smtClean="0"/>
+              <a:rPr lang="en-US"/>
               <a:t>Click to edit Master title style</a:t>
             </a:r>
-            <a:endParaRPr lang="en-US"/>
           </a:p>
         </p:txBody>
       </p:sp>
@@ -1981,38 +1964,37 @@
           <a:p>
             <a:pPr lvl="0"/>
             <a:r>
-              <a:rPr lang="en-US" smtClean="0"/>
+              <a:rPr lang="en-US"/>
               <a:t>Edit Master text styles</a:t>
             </a:r>
           </a:p>
           <a:p>
             <a:pPr lvl="1"/>
             <a:r>
-              <a:rPr lang="en-US" smtClean="0"/>
+              <a:rPr lang="en-US"/>
               <a:t>Second level</a:t>
             </a:r>
           </a:p>
           <a:p>
             <a:pPr lvl="2"/>
             <a:r>
-              <a:rPr lang="en-US" smtClean="0"/>
+              <a:rPr lang="en-US"/>
               <a:t>Third level</a:t>
             </a:r>
           </a:p>
           <a:p>
             <a:pPr lvl="3"/>
             <a:r>
-              <a:rPr lang="en-US" smtClean="0"/>
+              <a:rPr lang="en-US"/>
               <a:t>Fourth level</a:t>
             </a:r>
           </a:p>
           <a:p>
             <a:pPr lvl="4"/>
             <a:r>
-              <a:rPr lang="en-US" smtClean="0"/>
+              <a:rPr lang="en-US"/>
               <a:t>Fifth level</a:t>
             </a:r>
-            <a:endParaRPr lang="en-US"/>
           </a:p>
         </p:txBody>
       </p:sp>
@@ -2075,7 +2057,7 @@
           <a:p>
             <a:pPr lvl="0"/>
             <a:r>
-              <a:rPr lang="en-US" smtClean="0"/>
+              <a:rPr lang="en-US"/>
               <a:t>Edit Master text styles</a:t>
             </a:r>
           </a:p>
@@ -2098,7 +2080,7 @@
           <a:p>
             <a:fld id="{D6E7CE26-7B26-4829-8ED6-15EC512A912A}" type="datetimeFigureOut">
               <a:rPr lang="en-US" smtClean="0"/>
-              <a:t>12/22/2023</a:t>
+              <a:t>1/11/2024</a:t>
             </a:fld>
             <a:endParaRPr lang="en-US"/>
           </a:p>
@@ -2140,7 +2122,7 @@
           <a:p>
             <a:fld id="{87F34453-351E-48B2-B697-BECC1AAADE2A}" type="slidenum">
               <a:rPr lang="en-US" smtClean="0"/>
-              <a:t>‹#›</a:t>
+              <a:t>‹Nr.›</a:t>
             </a:fld>
             <a:endParaRPr lang="en-US"/>
           </a:p>
@@ -2201,10 +2183,9 @@
           </a:lstStyle>
           <a:p>
             <a:r>
-              <a:rPr lang="en-US" smtClean="0"/>
+              <a:rPr lang="en-US"/>
               <a:t>Click to edit Master title style</a:t>
             </a:r>
-            <a:endParaRPr lang="en-US"/>
           </a:p>
         </p:txBody>
       </p:sp>
@@ -2328,7 +2309,7 @@
           <a:p>
             <a:pPr lvl="0"/>
             <a:r>
-              <a:rPr lang="en-US" smtClean="0"/>
+              <a:rPr lang="en-US"/>
               <a:t>Edit Master text styles</a:t>
             </a:r>
           </a:p>
@@ -2351,7 +2332,7 @@
           <a:p>
             <a:fld id="{D6E7CE26-7B26-4829-8ED6-15EC512A912A}" type="datetimeFigureOut">
               <a:rPr lang="en-US" smtClean="0"/>
-              <a:t>12/22/2023</a:t>
+              <a:t>1/11/2024</a:t>
             </a:fld>
             <a:endParaRPr lang="en-US"/>
           </a:p>
@@ -2393,7 +2374,7 @@
           <a:p>
             <a:fld id="{87F34453-351E-48B2-B697-BECC1AAADE2A}" type="slidenum">
               <a:rPr lang="en-US" smtClean="0"/>
-              <a:t>‹#›</a:t>
+              <a:t>‹Nr.›</a:t>
             </a:fld>
             <a:endParaRPr lang="en-US"/>
           </a:p>
@@ -2460,10 +2441,9 @@
           <a:lstStyle/>
           <a:p>
             <a:r>
-              <a:rPr lang="en-US" smtClean="0"/>
+              <a:rPr lang="en-US"/>
               <a:t>Click to edit Master title style</a:t>
             </a:r>
-            <a:endParaRPr lang="en-US"/>
           </a:p>
         </p:txBody>
       </p:sp>
@@ -2494,38 +2474,37 @@
           <a:p>
             <a:pPr lvl="0"/>
             <a:r>
-              <a:rPr lang="en-US" smtClean="0"/>
+              <a:rPr lang="en-US"/>
               <a:t>Edit Master text styles</a:t>
             </a:r>
           </a:p>
           <a:p>
             <a:pPr lvl="1"/>
             <a:r>
-              <a:rPr lang="en-US" smtClean="0"/>
+              <a:rPr lang="en-US"/>
               <a:t>Second level</a:t>
             </a:r>
           </a:p>
           <a:p>
             <a:pPr lvl="2"/>
             <a:r>
-              <a:rPr lang="en-US" smtClean="0"/>
+              <a:rPr lang="en-US"/>
               <a:t>Third level</a:t>
             </a:r>
           </a:p>
           <a:p>
             <a:pPr lvl="3"/>
             <a:r>
-              <a:rPr lang="en-US" smtClean="0"/>
+              <a:rPr lang="en-US"/>
               <a:t>Fourth level</a:t>
             </a:r>
           </a:p>
           <a:p>
             <a:pPr lvl="4"/>
             <a:r>
-              <a:rPr lang="en-US" smtClean="0"/>
+              <a:rPr lang="en-US"/>
               <a:t>Fifth level</a:t>
             </a:r>
-            <a:endParaRPr lang="en-US"/>
           </a:p>
         </p:txBody>
       </p:sp>
@@ -2564,7 +2543,7 @@
           <a:p>
             <a:fld id="{D6E7CE26-7B26-4829-8ED6-15EC512A912A}" type="datetimeFigureOut">
               <a:rPr lang="en-US" smtClean="0"/>
-              <a:t>12/22/2023</a:t>
+              <a:t>1/11/2024</a:t>
             </a:fld>
             <a:endParaRPr lang="en-US"/>
           </a:p>
@@ -2642,7 +2621,7 @@
           <a:p>
             <a:fld id="{87F34453-351E-48B2-B697-BECC1AAADE2A}" type="slidenum">
               <a:rPr lang="en-US" smtClean="0"/>
-              <a:t>‹#›</a:t>
+              <a:t>‹Nr.›</a:t>
             </a:fld>
             <a:endParaRPr lang="en-US"/>
           </a:p>
@@ -3080,7 +3059,7 @@
           <a:p>
             <a:pPr algn="ctr"/>
             <a:r>
-              <a:rPr lang="de-DE" dirty="0" err="1" smtClean="0"/>
+              <a:rPr lang="de-DE" dirty="0" err="1"/>
               <a:t>Process</a:t>
             </a:r>
             <a:endParaRPr lang="en-US" dirty="0"/>
@@ -3177,6 +3156,57 @@
           </a:p>
         </p:txBody>
       </p:sp>
+      <p:sp>
+        <p:nvSpPr>
+          <p:cNvPr id="2" name="Rectangle 7">
+            <a:extLst>
+              <a:ext uri="{FF2B5EF4-FFF2-40B4-BE49-F238E27FC236}">
+                <a16:creationId xmlns:a16="http://schemas.microsoft.com/office/drawing/2014/main" id="{8E77AD15-FFDA-1238-7593-8B044B23A849}"/>
+              </a:ext>
+            </a:extLst>
+          </p:cNvPr>
+          <p:cNvSpPr/>
+          <p:nvPr/>
+        </p:nvSpPr>
+        <p:spPr>
+          <a:xfrm>
+            <a:off x="65689" y="1348030"/>
+            <a:ext cx="4621722" cy="1031186"/>
+          </a:xfrm>
+          <a:prstGeom prst="rect">
+            <a:avLst/>
+          </a:prstGeom>
+          <a:solidFill>
+            <a:schemeClr val="accent6">
+              <a:alpha val="50000"/>
+            </a:schemeClr>
+          </a:solidFill>
+        </p:spPr>
+        <p:style>
+          <a:lnRef idx="2">
+            <a:schemeClr val="accent6">
+              <a:shade val="50000"/>
+            </a:schemeClr>
+          </a:lnRef>
+          <a:fillRef idx="1">
+            <a:schemeClr val="accent6"/>
+          </a:fillRef>
+          <a:effectRef idx="0">
+            <a:schemeClr val="accent6"/>
+          </a:effectRef>
+          <a:fontRef idx="minor">
+            <a:schemeClr val="lt1"/>
+          </a:fontRef>
+        </p:style>
+        <p:txBody>
+          <a:bodyPr rtlCol="0" anchor="ctr"/>
+          <a:lstStyle/>
+          <a:p>
+            <a:pPr algn="ctr"/>
+            <a:endParaRPr lang="en-US"/>
+          </a:p>
+        </p:txBody>
+      </p:sp>
     </p:spTree>
     <p:extLst>
       <p:ext uri="{BB962C8B-B14F-4D97-AF65-F5344CB8AC3E}">
@@ -3187,13 +3217,6 @@
   <p:clrMapOvr>
     <a:masterClrMapping/>
   </p:clrMapOvr>
-  <p:timing>
-    <p:tnLst>
-      <p:par>
-        <p:cTn id="1" dur="indefinite" restart="never" nodeType="tmRoot"/>
-      </p:par>
-    </p:tnLst>
-  </p:timing>
 </p:sld>
 </file>
 

</xml_diff>